<commit_message>
fix typo, fix network lab that cannot assign fix ip address.
</commit_message>
<xml_diff>
--- a/Powerpoint/01.Intro-to-docker.pptx
+++ b/Powerpoint/01.Intro-to-docker.pptx
@@ -3811,9 +3811,9 @@
       </p:par>
     </p:tnLst>
     <p:bldLst>
-      <p:bldP build="whole" bldLvl="1" animBg="1" rev="0" advAuto="0" spid="208" grpId="2"/>
       <p:bldP build="whole" bldLvl="1" animBg="1" rev="0" advAuto="0" spid="210" grpId="1"/>
       <p:bldP build="whole" bldLvl="1" animBg="1" rev="0" advAuto="0" spid="209" grpId="3"/>
+      <p:bldP build="whole" bldLvl="1" animBg="1" rev="0" advAuto="0" spid="208" grpId="2"/>
     </p:bldLst>
   </p:timing>
 </p:sld>
@@ -5748,8 +5748,8 @@
         </p:nvSpPr>
         <p:spPr>
           <a:xfrm>
-            <a:off x="1765300" y="4787900"/>
-            <a:ext cx="1476326" cy="1930401"/>
+            <a:off x="1765300" y="4371652"/>
+            <a:ext cx="1629495" cy="2762896"/>
           </a:xfrm>
           <a:prstGeom prst="rect">
             <a:avLst/>
@@ -5919,8 +5919,8 @@
         </p:nvSpPr>
         <p:spPr>
           <a:xfrm>
-            <a:off x="5443655" y="5054599"/>
-            <a:ext cx="1448049" cy="1016001"/>
+            <a:off x="5443655" y="4847902"/>
+            <a:ext cx="1497162" cy="1429396"/>
           </a:xfrm>
           <a:prstGeom prst="rect">
             <a:avLst/>
@@ -6036,8 +6036,8 @@
         </p:nvSpPr>
         <p:spPr>
           <a:xfrm>
-            <a:off x="8999512" y="5891051"/>
-            <a:ext cx="2944888" cy="2844801"/>
+            <a:off x="8999512" y="5265253"/>
+            <a:ext cx="3371777" cy="4096396"/>
           </a:xfrm>
           <a:prstGeom prst="rect">
             <a:avLst/>
@@ -6467,9 +6467,9 @@
       </p:par>
     </p:tnLst>
     <p:bldLst>
-      <p:bldP build="whole" bldLvl="1" animBg="1" rev="0" advAuto="0" spid="127" grpId="1"/>
       <p:bldP build="whole" bldLvl="1" animBg="1" rev="0" advAuto="0" spid="129" grpId="2"/>
       <p:bldP build="whole" bldLvl="1" animBg="1" rev="0" advAuto="0" spid="131" grpId="3"/>
+      <p:bldP build="whole" bldLvl="1" animBg="1" rev="0" advAuto="0" spid="127" grpId="1"/>
     </p:bldLst>
   </p:timing>
 </p:sld>
@@ -6705,8 +6705,8 @@
         </p:nvSpPr>
         <p:spPr>
           <a:xfrm>
-            <a:off x="4064977" y="3117849"/>
-            <a:ext cx="1627387" cy="342901"/>
+            <a:off x="4064977" y="3062982"/>
+            <a:ext cx="1742382" cy="452636"/>
           </a:xfrm>
           <a:prstGeom prst="rect">
             <a:avLst/>
@@ -6730,10 +6730,10 @@
                 <a:solidFill>
                   <a:srgbClr val="53585F"/>
                 </a:solidFill>
-                <a:latin typeface="Helvetica"/>
-                <a:ea typeface="Helvetica"/>
-                <a:cs typeface="Helvetica"/>
-                <a:sym typeface="Helvetica"/>
+                <a:latin typeface="Segoe Print"/>
+                <a:ea typeface="Segoe Print"/>
+                <a:cs typeface="Segoe Print"/>
+                <a:sym typeface="Segoe Print"/>
               </a:defRPr>
             </a:lvl1pPr>
           </a:lstStyle>
@@ -6753,8 +6753,8 @@
         </p:nvSpPr>
         <p:spPr>
           <a:xfrm>
-            <a:off x="3125177" y="4828363"/>
-            <a:ext cx="848222" cy="342901"/>
+            <a:off x="3125177" y="4773495"/>
+            <a:ext cx="883644" cy="452637"/>
           </a:xfrm>
           <a:prstGeom prst="rect">
             <a:avLst/>
@@ -6778,10 +6778,10 @@
                 <a:solidFill>
                   <a:srgbClr val="53585F"/>
                 </a:solidFill>
-                <a:latin typeface="Helvetica"/>
-                <a:ea typeface="Helvetica"/>
-                <a:cs typeface="Helvetica"/>
-                <a:sym typeface="Helvetica"/>
+                <a:latin typeface="Segoe Print"/>
+                <a:ea typeface="Segoe Print"/>
+                <a:cs typeface="Segoe Print"/>
+                <a:sym typeface="Segoe Print"/>
               </a:defRPr>
             </a:lvl1pPr>
           </a:lstStyle>
@@ -6801,8 +6801,8 @@
         </p:nvSpPr>
         <p:spPr>
           <a:xfrm>
-            <a:off x="5782988" y="5484514"/>
-            <a:ext cx="486867" cy="342901"/>
+            <a:off x="5782988" y="5429646"/>
+            <a:ext cx="490538" cy="452637"/>
           </a:xfrm>
           <a:prstGeom prst="rect">
             <a:avLst/>
@@ -6826,10 +6826,10 @@
                 <a:solidFill>
                   <a:srgbClr val="53585F"/>
                 </a:solidFill>
-                <a:latin typeface="Helvetica"/>
-                <a:ea typeface="Helvetica"/>
-                <a:cs typeface="Helvetica"/>
-                <a:sym typeface="Helvetica"/>
+                <a:latin typeface="Segoe Print"/>
+                <a:ea typeface="Segoe Print"/>
+                <a:cs typeface="Segoe Print"/>
+                <a:sym typeface="Segoe Print"/>
               </a:defRPr>
             </a:lvl1pPr>
           </a:lstStyle>
@@ -6875,8 +6875,8 @@
         </p:nvSpPr>
         <p:spPr>
           <a:xfrm>
-            <a:off x="3046625" y="8441251"/>
-            <a:ext cx="2695775" cy="584201"/>
+            <a:off x="2910894" y="8329233"/>
+            <a:ext cx="2967237" cy="808237"/>
           </a:xfrm>
           <a:prstGeom prst="rect">
             <a:avLst/>
@@ -6901,10 +6901,10 @@
                 <a:solidFill>
                   <a:srgbClr val="53585F"/>
                 </a:solidFill>
-                <a:latin typeface="Helvetica"/>
-                <a:ea typeface="Helvetica"/>
-                <a:cs typeface="Helvetica"/>
-                <a:sym typeface="Helvetica"/>
+                <a:latin typeface="Segoe Print"/>
+                <a:ea typeface="Segoe Print"/>
+                <a:cs typeface="Segoe Print"/>
+                <a:sym typeface="Segoe Print"/>
               </a:defRPr>
             </a:pPr>
             <a:r>
@@ -7043,8 +7043,8 @@
         </p:nvSpPr>
         <p:spPr>
           <a:xfrm>
-            <a:off x="7842370" y="6138564"/>
-            <a:ext cx="1051323" cy="584201"/>
+            <a:off x="7804568" y="6026546"/>
+            <a:ext cx="1126928" cy="808237"/>
           </a:xfrm>
           <a:prstGeom prst="rect">
             <a:avLst/>
@@ -7069,10 +7069,10 @@
                 <a:solidFill>
                   <a:srgbClr val="53585F"/>
                 </a:solidFill>
-                <a:latin typeface="Helvetica"/>
-                <a:ea typeface="Helvetica"/>
-                <a:cs typeface="Helvetica"/>
-                <a:sym typeface="Helvetica"/>
+                <a:latin typeface="Segoe Print"/>
+                <a:ea typeface="Segoe Print"/>
+                <a:cs typeface="Segoe Print"/>
+                <a:sym typeface="Segoe Print"/>
               </a:defRPr>
             </a:pPr>
             <a:r>
@@ -7093,8 +7093,8 @@
         </p:nvSpPr>
         <p:spPr>
           <a:xfrm>
-            <a:off x="7836616" y="7697469"/>
-            <a:ext cx="1062832" cy="584201"/>
+            <a:off x="7804618" y="7585451"/>
+            <a:ext cx="1126828" cy="808237"/>
           </a:xfrm>
           <a:prstGeom prst="rect">
             <a:avLst/>
@@ -7119,10 +7119,10 @@
                 <a:solidFill>
                   <a:srgbClr val="53585F"/>
                 </a:solidFill>
-                <a:latin typeface="Helvetica"/>
-                <a:ea typeface="Helvetica"/>
-                <a:cs typeface="Helvetica"/>
-                <a:sym typeface="Helvetica"/>
+                <a:latin typeface="Segoe Print"/>
+                <a:ea typeface="Segoe Print"/>
+                <a:cs typeface="Segoe Print"/>
+                <a:sym typeface="Segoe Print"/>
               </a:defRPr>
             </a:pPr>
             <a:r>
@@ -7935,22 +7935,22 @@
       </p:par>
     </p:tnLst>
     <p:bldLst>
+      <p:bldP build="whole" bldLvl="1" animBg="1" rev="0" advAuto="0" spid="151" grpId="10"/>
+      <p:bldP build="whole" bldLvl="1" animBg="1" rev="0" advAuto="0" spid="167" grpId="12"/>
+      <p:bldP build="whole" bldLvl="1" animBg="1" rev="0" advAuto="0" spid="169" grpId="14"/>
+      <p:bldP build="whole" bldLvl="1" animBg="1" rev="0" advAuto="0" spid="153" grpId="15"/>
+      <p:bldP build="whole" bldLvl="1" animBg="1" rev="0" advAuto="0" spid="157" grpId="16"/>
+      <p:bldP build="whole" bldLvl="1" animBg="1" rev="0" advAuto="0" spid="156" grpId="13"/>
       <p:bldP build="whole" bldLvl="1" animBg="1" rev="0" advAuto="0" spid="159" grpId="2"/>
+      <p:bldP build="whole" bldLvl="1" animBg="1" rev="0" advAuto="0" spid="163" grpId="4"/>
+      <p:bldP build="whole" bldLvl="1" animBg="1" rev="0" advAuto="0" spid="143" grpId="3"/>
+      <p:bldP build="whole" bldLvl="1" animBg="1" rev="0" advAuto="0" spid="161" grpId="7"/>
+      <p:bldP build="whole" bldLvl="1" animBg="1" rev="0" advAuto="0" spid="148" grpId="5"/>
+      <p:bldP build="whole" bldLvl="1" animBg="1" rev="0" advAuto="0" spid="147" grpId="1"/>
       <p:bldP build="whole" bldLvl="1" animBg="1" rev="0" advAuto="0" spid="149" grpId="8"/>
-      <p:bldP build="whole" bldLvl="1" animBg="1" rev="0" advAuto="0" spid="147" grpId="1"/>
-      <p:bldP build="whole" bldLvl="1" animBg="1" rev="0" advAuto="0" spid="163" grpId="4"/>
-      <p:bldP build="whole" bldLvl="1" animBg="1" rev="0" advAuto="0" spid="153" grpId="15"/>
+      <p:bldP build="whole" bldLvl="1" animBg="1" rev="0" advAuto="0" spid="152" grpId="11"/>
+      <p:bldP build="whole" bldLvl="1" animBg="1" rev="0" advAuto="0" spid="165" grpId="9"/>
       <p:bldP build="whole" bldLvl="1" animBg="1" rev="0" advAuto="0" spid="144" grpId="6"/>
-      <p:bldP build="whole" bldLvl="1" animBg="1" rev="0" advAuto="0" spid="157" grpId="16"/>
-      <p:bldP build="whole" bldLvl="1" animBg="1" rev="0" advAuto="0" spid="152" grpId="11"/>
-      <p:bldP build="whole" bldLvl="1" animBg="1" rev="0" advAuto="0" spid="161" grpId="7"/>
-      <p:bldP build="whole" bldLvl="1" animBg="1" rev="0" advAuto="0" spid="151" grpId="10"/>
-      <p:bldP build="whole" bldLvl="1" animBg="1" rev="0" advAuto="0" spid="143" grpId="3"/>
-      <p:bldP build="whole" bldLvl="1" animBg="1" rev="0" advAuto="0" spid="165" grpId="9"/>
-      <p:bldP build="whole" bldLvl="1" animBg="1" rev="0" advAuto="0" spid="167" grpId="12"/>
-      <p:bldP build="whole" bldLvl="1" animBg="1" rev="0" advAuto="0" spid="156" grpId="13"/>
-      <p:bldP build="whole" bldLvl="1" animBg="1" rev="0" advAuto="0" spid="148" grpId="5"/>
-      <p:bldP build="whole" bldLvl="1" animBg="1" rev="0" advAuto="0" spid="169" grpId="14"/>
     </p:bldLst>
   </p:timing>
 </p:sld>

</xml_diff>